<commit_message>
add novo slide, alteração na ordem dos itens do javascrtipt
</commit_message>
<xml_diff>
--- a/TCC/apresentação-tcc.pptx
+++ b/TCC/apresentação-tcc.pptx
@@ -5,7 +5,7 @@
     <p:sldMasterId id="2147483828" r:id="rId1"/>
   </p:sldMasterIdLst>
   <p:notesMasterIdLst>
-    <p:notesMasterId r:id="rId25"/>
+    <p:notesMasterId r:id="rId26"/>
   </p:notesMasterIdLst>
   <p:sldIdLst>
     <p:sldId id="256" r:id="rId2"/>
@@ -31,6 +31,7 @@
     <p:sldId id="276" r:id="rId22"/>
     <p:sldId id="277" r:id="rId23"/>
     <p:sldId id="278" r:id="rId24"/>
+    <p:sldId id="279" r:id="rId25"/>
   </p:sldIdLst>
   <p:sldSz cx="9144000" cy="6858000" type="screen4x3"/>
   <p:notesSz cx="6858000" cy="9144000"/>
@@ -214,7 +215,7 @@
           <a:p>
             <a:fld id="{5A507618-0005-41AF-A887-B4009C525EF6}" type="datetimeFigureOut">
               <a:rPr lang="pt-BR" smtClean="0"/>
-              <a:t>03/06/2015</a:t>
+              <a:t>10/06/2015</a:t>
             </a:fld>
             <a:endParaRPr lang="pt-BR"/>
           </a:p>
@@ -1463,7 +1464,7 @@
           <a:p>
             <a:fld id="{42224247-9EF7-4638-BE46-641908F16E6E}" type="datetimeFigureOut">
               <a:rPr lang="pt-BR" smtClean="0"/>
-              <a:t>03/06/2015</a:t>
+              <a:t>10/06/2015</a:t>
             </a:fld>
             <a:endParaRPr lang="pt-BR"/>
           </a:p>
@@ -1659,7 +1660,7 @@
           <a:p>
             <a:fld id="{42224247-9EF7-4638-BE46-641908F16E6E}" type="datetimeFigureOut">
               <a:rPr lang="pt-BR" smtClean="0"/>
-              <a:t>03/06/2015</a:t>
+              <a:t>10/06/2015</a:t>
             </a:fld>
             <a:endParaRPr lang="pt-BR"/>
           </a:p>
@@ -1844,7 +1845,7 @@
           <a:p>
             <a:fld id="{42224247-9EF7-4638-BE46-641908F16E6E}" type="datetimeFigureOut">
               <a:rPr lang="pt-BR" smtClean="0"/>
-              <a:t>03/06/2015</a:t>
+              <a:t>10/06/2015</a:t>
             </a:fld>
             <a:endParaRPr lang="pt-BR"/>
           </a:p>
@@ -1994,7 +1995,7 @@
           <a:p>
             <a:fld id="{42224247-9EF7-4638-BE46-641908F16E6E}" type="datetimeFigureOut">
               <a:rPr lang="pt-BR" smtClean="0"/>
-              <a:t>03/06/2015</a:t>
+              <a:t>10/06/2015</a:t>
             </a:fld>
             <a:endParaRPr lang="pt-BR"/>
           </a:p>
@@ -2249,7 +2250,7 @@
           <a:p>
             <a:fld id="{42224247-9EF7-4638-BE46-641908F16E6E}" type="datetimeFigureOut">
               <a:rPr lang="pt-BR" smtClean="0"/>
-              <a:t>03/06/2015</a:t>
+              <a:t>10/06/2015</a:t>
             </a:fld>
             <a:endParaRPr lang="pt-BR"/>
           </a:p>
@@ -2658,7 +2659,7 @@
           <a:p>
             <a:fld id="{42224247-9EF7-4638-BE46-641908F16E6E}" type="datetimeFigureOut">
               <a:rPr lang="pt-BR" smtClean="0"/>
-              <a:t>03/06/2015</a:t>
+              <a:t>10/06/2015</a:t>
             </a:fld>
             <a:endParaRPr lang="pt-BR"/>
           </a:p>
@@ -3104,7 +3105,7 @@
           <a:p>
             <a:fld id="{42224247-9EF7-4638-BE46-641908F16E6E}" type="datetimeFigureOut">
               <a:rPr lang="pt-BR" smtClean="0"/>
-              <a:t>03/06/2015</a:t>
+              <a:t>10/06/2015</a:t>
             </a:fld>
             <a:endParaRPr lang="pt-BR"/>
           </a:p>
@@ -3205,7 +3206,7 @@
           <a:p>
             <a:fld id="{42224247-9EF7-4638-BE46-641908F16E6E}" type="datetimeFigureOut">
               <a:rPr lang="pt-BR" smtClean="0"/>
-              <a:t>03/06/2015</a:t>
+              <a:t>10/06/2015</a:t>
             </a:fld>
             <a:endParaRPr lang="pt-BR"/>
           </a:p>
@@ -3326,7 +3327,7 @@
           <a:p>
             <a:fld id="{42224247-9EF7-4638-BE46-641908F16E6E}" type="datetimeFigureOut">
               <a:rPr lang="pt-BR" smtClean="0"/>
-              <a:t>03/06/2015</a:t>
+              <a:t>10/06/2015</a:t>
             </a:fld>
             <a:endParaRPr lang="pt-BR"/>
           </a:p>
@@ -3600,7 +3601,7 @@
           <a:p>
             <a:fld id="{42224247-9EF7-4638-BE46-641908F16E6E}" type="datetimeFigureOut">
               <a:rPr lang="pt-BR" smtClean="0"/>
-              <a:t>03/06/2015</a:t>
+              <a:t>10/06/2015</a:t>
             </a:fld>
             <a:endParaRPr lang="pt-BR"/>
           </a:p>
@@ -3805,7 +3806,7 @@
           <a:p>
             <a:fld id="{42224247-9EF7-4638-BE46-641908F16E6E}" type="datetimeFigureOut">
               <a:rPr lang="pt-BR" smtClean="0"/>
-              <a:t>03/06/2015</a:t>
+              <a:t>10/06/2015</a:t>
             </a:fld>
             <a:endParaRPr lang="pt-BR"/>
           </a:p>
@@ -4914,7 +4915,7 @@
           <a:p>
             <a:fld id="{42224247-9EF7-4638-BE46-641908F16E6E}" type="datetimeFigureOut">
               <a:rPr lang="pt-BR" smtClean="0"/>
-              <a:t>03/06/2015</a:t>
+              <a:t>10/06/2015</a:t>
             </a:fld>
             <a:endParaRPr lang="pt-BR"/>
           </a:p>
@@ -5470,14 +5471,33 @@
         <p:spPr>
           <a:xfrm>
             <a:off x="3519516" y="1361319"/>
-            <a:ext cx="5372964" cy="4227921"/>
+            <a:ext cx="5372964" cy="4515953"/>
           </a:xfrm>
         </p:spPr>
         <p:txBody>
           <a:bodyPr>
-            <a:normAutofit/>
+            <a:normAutofit lnSpcReduction="10000"/>
           </a:bodyPr>
           <a:lstStyle/>
+          <a:p>
+            <a:pPr>
+              <a:buFont typeface="Arial" panose="020B0604020202020204" pitchFamily="34" charset="0"/>
+              <a:buChar char="•"/>
+            </a:pPr>
+            <a:r>
+              <a:rPr lang="pt-BR" sz="3200" dirty="0" err="1"/>
+              <a:t>Scalable</a:t>
+            </a:r>
+            <a:r>
+              <a:rPr lang="pt-BR" sz="3200" dirty="0"/>
+              <a:t> Vector </a:t>
+            </a:r>
+            <a:r>
+              <a:rPr lang="pt-BR" sz="3200" dirty="0" err="1"/>
+              <a:t>Graphics</a:t>
+            </a:r>
+            <a:endParaRPr lang="pt-BR" sz="3200" dirty="0"/>
+          </a:p>
           <a:p>
             <a:pPr>
               <a:buFont typeface="Arial" panose="020B0604020202020204" pitchFamily="34" charset="0"/>
@@ -5623,8 +5643,8 @@
         </p:nvSpPr>
         <p:spPr>
           <a:xfrm>
-            <a:off x="8316416" y="6390123"/>
-            <a:ext cx="638316" cy="276999"/>
+            <a:off x="8538022" y="6390123"/>
+            <a:ext cx="282450" cy="276999"/>
           </a:xfrm>
           <a:prstGeom prst="rect">
             <a:avLst/>
@@ -5639,7 +5659,7 @@
           <a:p>
             <a:r>
               <a:rPr lang="pt-BR" sz="1200" dirty="0" smtClean="0"/>
-              <a:t>Rafael</a:t>
+              <a:t>R</a:t>
             </a:r>
             <a:endParaRPr lang="pt-BR" sz="1200" dirty="0"/>
           </a:p>
@@ -5888,7 +5908,7 @@
         <p:spPr>
           <a:xfrm>
             <a:off x="8316416" y="6390123"/>
-            <a:ext cx="734496" cy="276999"/>
+            <a:ext cx="316112" cy="276999"/>
           </a:xfrm>
           <a:prstGeom prst="rect">
             <a:avLst/>
@@ -5903,7 +5923,7 @@
           <a:p>
             <a:r>
               <a:rPr lang="pt-BR" sz="1200" dirty="0" smtClean="0"/>
-              <a:t>Weslley</a:t>
+              <a:t>W</a:t>
             </a:r>
             <a:endParaRPr lang="pt-BR" sz="1200" dirty="0"/>
           </a:p>
@@ -6077,8 +6097,8 @@
         </p:nvSpPr>
         <p:spPr>
           <a:xfrm>
-            <a:off x="8316416" y="6390123"/>
-            <a:ext cx="615874" cy="276999"/>
+            <a:off x="8482044" y="6390123"/>
+            <a:ext cx="266420" cy="276999"/>
           </a:xfrm>
           <a:prstGeom prst="rect">
             <a:avLst/>
@@ -6093,7 +6113,7 @@
           <a:p>
             <a:r>
               <a:rPr lang="pt-BR" sz="1200" dirty="0" smtClean="0"/>
-              <a:t>Flávio</a:t>
+              <a:t>F</a:t>
             </a:r>
             <a:endParaRPr lang="pt-BR" sz="1200" dirty="0"/>
           </a:p>
@@ -6158,7 +6178,10 @@
           </a:bodyPr>
           <a:lstStyle/>
           <a:p>
-            <a:pPr marL="0" indent="0"/>
+            <a:pPr marL="457200" indent="-457200">
+              <a:buFont typeface="Arial" panose="020B0604020202020204" pitchFamily="34" charset="0"/>
+              <a:buChar char="•"/>
+            </a:pPr>
             <a:r>
               <a:rPr lang="pt-BR" sz="3200" dirty="0" smtClean="0"/>
               <a:t>Gráficos de bolha</a:t>
@@ -6285,7 +6308,10 @@
           </a:bodyPr>
           <a:lstStyle/>
           <a:p>
-            <a:pPr marL="0" indent="0"/>
+            <a:pPr marL="457200" indent="-457200">
+              <a:buFont typeface="Arial" panose="020B0604020202020204" pitchFamily="34" charset="0"/>
+              <a:buChar char="•"/>
+            </a:pPr>
             <a:r>
               <a:rPr lang="pt-BR" sz="3200" dirty="0" smtClean="0"/>
               <a:t>Gráficos de Hexágonos</a:t>
@@ -6408,11 +6434,14 @@
         </p:spPr>
         <p:txBody>
           <a:bodyPr>
-            <a:normAutofit lnSpcReduction="10000"/>
+            <a:normAutofit fontScale="92500"/>
           </a:bodyPr>
           <a:lstStyle/>
           <a:p>
-            <a:pPr marL="0" indent="0"/>
+            <a:pPr marL="457200" indent="-457200">
+              <a:buFont typeface="Arial" panose="020B0604020202020204" pitchFamily="34" charset="0"/>
+              <a:buChar char="•"/>
+            </a:pPr>
             <a:r>
               <a:rPr lang="pt-BR" sz="3200" dirty="0" smtClean="0"/>
               <a:t>Gráficos de pedaços</a:t>
@@ -6539,7 +6568,10 @@
           </a:bodyPr>
           <a:lstStyle/>
           <a:p>
-            <a:pPr marL="0" indent="0"/>
+            <a:pPr marL="457200" indent="-457200">
+              <a:buFont typeface="Arial" panose="020B0604020202020204" pitchFamily="34" charset="0"/>
+              <a:buChar char="•"/>
+            </a:pPr>
             <a:r>
               <a:rPr lang="pt-BR" sz="3200" dirty="0" smtClean="0"/>
               <a:t>Gráfico em radial</a:t>
@@ -6666,7 +6698,10 @@
           </a:bodyPr>
           <a:lstStyle/>
           <a:p>
-            <a:pPr marL="0" indent="0"/>
+            <a:pPr marL="457200" indent="-457200">
+              <a:buFont typeface="Arial" panose="020B0604020202020204" pitchFamily="34" charset="0"/>
+              <a:buChar char="•"/>
+            </a:pPr>
             <a:r>
               <a:rPr lang="pt-BR" sz="3200" dirty="0" smtClean="0"/>
               <a:t>Gráfico </a:t>
@@ -6885,7 +6920,7 @@
         <p:spPr>
           <a:xfrm>
             <a:off x="8316416" y="6390123"/>
-            <a:ext cx="615874" cy="276999"/>
+            <a:ext cx="266420" cy="276999"/>
           </a:xfrm>
           <a:prstGeom prst="rect">
             <a:avLst/>
@@ -6900,7 +6935,7 @@
           <a:p>
             <a:r>
               <a:rPr lang="pt-BR" sz="1200" dirty="0" smtClean="0"/>
-              <a:t>Flávio</a:t>
+              <a:t>F</a:t>
             </a:r>
             <a:endParaRPr lang="pt-BR" sz="1200" dirty="0"/>
           </a:p>
@@ -6960,6 +6995,10 @@
           </a:bodyPr>
           <a:lstStyle/>
           <a:p>
+            <a:pPr>
+              <a:buFont typeface="Arial" panose="020B0604020202020204" pitchFamily="34" charset="0"/>
+              <a:buChar char="•"/>
+            </a:pPr>
             <a:r>
               <a:rPr lang="pt-BR" sz="3200" dirty="0" smtClean="0"/>
               <a:t>Novas ferramentas de comparação</a:t>
@@ -7059,8 +7098,8 @@
         </p:nvSpPr>
         <p:spPr>
           <a:xfrm>
-            <a:off x="8316416" y="6390123"/>
-            <a:ext cx="638316" cy="276999"/>
+            <a:off x="8466014" y="6390123"/>
+            <a:ext cx="282450" cy="276999"/>
           </a:xfrm>
           <a:prstGeom prst="rect">
             <a:avLst/>
@@ -7075,7 +7114,7 @@
           <a:p>
             <a:r>
               <a:rPr lang="pt-BR" sz="1200" dirty="0" smtClean="0"/>
-              <a:t>Rafael</a:t>
+              <a:t>R</a:t>
             </a:r>
             <a:endParaRPr lang="pt-BR" sz="1200" dirty="0"/>
           </a:p>
@@ -7151,7 +7190,7 @@
             </a:pPr>
             <a:r>
               <a:rPr lang="pt-BR" sz="3200" dirty="0" smtClean="0"/>
-              <a:t>Problema é em analisa-los</a:t>
+              <a:t>Problema é em analisá-los</a:t>
             </a:r>
           </a:p>
           <a:p>
@@ -7198,8 +7237,8 @@
         </p:nvSpPr>
         <p:spPr>
           <a:xfrm>
-            <a:off x="8316416" y="6390123"/>
-            <a:ext cx="615874" cy="276999"/>
+            <a:off x="8554052" y="6390123"/>
+            <a:ext cx="266420" cy="276999"/>
           </a:xfrm>
           <a:prstGeom prst="rect">
             <a:avLst/>
@@ -7214,7 +7253,7 @@
           <a:p>
             <a:r>
               <a:rPr lang="pt-BR" sz="1200" dirty="0" smtClean="0"/>
-              <a:t>Flávio</a:t>
+              <a:t>F</a:t>
             </a:r>
             <a:endParaRPr lang="pt-BR" sz="1200" dirty="0"/>
           </a:p>
@@ -7274,6 +7313,10 @@
           </a:bodyPr>
           <a:lstStyle/>
           <a:p>
+            <a:pPr>
+              <a:buFont typeface="Arial" panose="020B0604020202020204" pitchFamily="34" charset="0"/>
+              <a:buChar char="•"/>
+            </a:pPr>
             <a:r>
               <a:rPr lang="pt-BR" sz="3200" dirty="0" smtClean="0"/>
               <a:t>Eventos de mouse suportados</a:t>
@@ -7290,6 +7333,13 @@
             <a:pPr lvl="1"/>
             <a:r>
               <a:rPr lang="pt-BR" sz="3200" dirty="0" smtClean="0"/>
+              <a:t>Clicar; Duplo clique; Clicar e arrastar </a:t>
+            </a:r>
+          </a:p>
+          <a:p>
+            <a:pPr lvl="1"/>
+            <a:r>
+              <a:rPr lang="pt-BR" sz="3200" dirty="0" smtClean="0"/>
               <a:t>Saber o quão interativo são os gráficos</a:t>
             </a:r>
           </a:p>
@@ -7314,7 +7364,6 @@
               <a:rPr lang="pt-BR" dirty="0"/>
               <a:t>PERSPECTIVAS PARA TC2</a:t>
             </a:r>
-            <a:endParaRPr lang="pt-BR" dirty="0"/>
           </a:p>
         </p:txBody>
       </p:sp>
@@ -7326,8 +7375,8 @@
         </p:nvSpPr>
         <p:spPr>
           <a:xfrm>
-            <a:off x="8316416" y="6390123"/>
-            <a:ext cx="596638" cy="276999"/>
+            <a:off x="8552450" y="6390123"/>
+            <a:ext cx="268022" cy="276999"/>
           </a:xfrm>
           <a:prstGeom prst="rect">
             <a:avLst/>
@@ -7342,7 +7391,7 @@
           <a:p>
             <a:r>
               <a:rPr lang="pt-BR" sz="1200" dirty="0" smtClean="0"/>
-              <a:t>Sarah</a:t>
+              <a:t>S</a:t>
             </a:r>
             <a:endParaRPr lang="pt-BR" sz="1200" dirty="0"/>
           </a:p>
@@ -7407,6 +7456,10 @@
           </a:bodyPr>
           <a:lstStyle/>
           <a:p>
+            <a:pPr>
+              <a:buFont typeface="Arial" panose="020B0604020202020204" pitchFamily="34" charset="0"/>
+              <a:buChar char="•"/>
+            </a:pPr>
             <a:r>
               <a:rPr lang="pt-BR" sz="3200" dirty="0" smtClean="0"/>
               <a:t>Tempo de renderização</a:t>
@@ -7440,7 +7493,6 @@
               <a:rPr lang="pt-BR" dirty="0"/>
               <a:t>PERSPECTIVAS PARA TC2</a:t>
             </a:r>
-            <a:endParaRPr lang="pt-BR" dirty="0"/>
           </a:p>
         </p:txBody>
       </p:sp>
@@ -7452,8 +7504,8 @@
         </p:nvSpPr>
         <p:spPr>
           <a:xfrm>
-            <a:off x="8244408" y="6390123"/>
-            <a:ext cx="615874" cy="276999"/>
+            <a:off x="8482044" y="6390123"/>
+            <a:ext cx="266420" cy="276999"/>
           </a:xfrm>
           <a:prstGeom prst="rect">
             <a:avLst/>
@@ -7467,9 +7519,10 @@
           <a:lstStyle/>
           <a:p>
             <a:r>
-              <a:rPr lang="pt-BR" sz="1200" dirty="0"/>
-              <a:t>Flávio</a:t>
-            </a:r>
+              <a:rPr lang="pt-BR" sz="1200" dirty="0" smtClean="0"/>
+              <a:t>F</a:t>
+            </a:r>
+            <a:endParaRPr lang="pt-BR" sz="1200" dirty="0"/>
           </a:p>
         </p:txBody>
       </p:sp>
@@ -7527,6 +7580,10 @@
           </a:bodyPr>
           <a:lstStyle/>
           <a:p>
+            <a:pPr>
+              <a:buFont typeface="Arial" panose="020B0604020202020204" pitchFamily="34" charset="0"/>
+              <a:buChar char="•"/>
+            </a:pPr>
             <a:r>
               <a:rPr lang="pt-BR" sz="3200" dirty="0" smtClean="0"/>
               <a:t>Outros gráficos</a:t>
@@ -7536,7 +7593,7 @@
             <a:pPr lvl="1"/>
             <a:r>
               <a:rPr lang="pt-BR" sz="3200" dirty="0" smtClean="0"/>
-              <a:t>Gráficos de linha</a:t>
+              <a:t>Linha</a:t>
             </a:r>
           </a:p>
           <a:p>
@@ -7595,7 +7652,6 @@
               <a:rPr lang="pt-BR" dirty="0"/>
               <a:t>PERSPECTIVAS PARA TC2</a:t>
             </a:r>
-            <a:endParaRPr lang="pt-BR" dirty="0"/>
           </a:p>
         </p:txBody>
       </p:sp>
@@ -7607,8 +7663,8 @@
         </p:nvSpPr>
         <p:spPr>
           <a:xfrm>
-            <a:off x="8316416" y="6390123"/>
-            <a:ext cx="638316" cy="276999"/>
+            <a:off x="8610030" y="6390123"/>
+            <a:ext cx="282450" cy="276999"/>
           </a:xfrm>
           <a:prstGeom prst="rect">
             <a:avLst/>
@@ -7623,7 +7679,7 @@
           <a:p>
             <a:r>
               <a:rPr lang="pt-BR" sz="1200" dirty="0" smtClean="0"/>
-              <a:t>Rafael</a:t>
+              <a:t>R</a:t>
             </a:r>
             <a:endParaRPr lang="pt-BR" sz="1200" dirty="0"/>
           </a:p>
@@ -7683,6 +7739,10 @@
           </a:bodyPr>
           <a:lstStyle/>
           <a:p>
+            <a:pPr>
+              <a:buFont typeface="Arial" panose="020B0604020202020204" pitchFamily="34" charset="0"/>
+              <a:buChar char="•"/>
+            </a:pPr>
             <a:r>
               <a:rPr lang="pt-BR" sz="3200" dirty="0" smtClean="0"/>
               <a:t>Métricas Qualitativas</a:t>
@@ -7730,7 +7790,6 @@
               <a:rPr lang="pt-BR" dirty="0"/>
               <a:t>PERSPECTIVAS PARA TC2</a:t>
             </a:r>
-            <a:endParaRPr lang="pt-BR" dirty="0"/>
           </a:p>
         </p:txBody>
       </p:sp>
@@ -7742,8 +7801,8 @@
         </p:nvSpPr>
         <p:spPr>
           <a:xfrm>
-            <a:off x="8316416" y="6390123"/>
-            <a:ext cx="734496" cy="276999"/>
+            <a:off x="8432352" y="6390123"/>
+            <a:ext cx="316112" cy="276999"/>
           </a:xfrm>
           <a:prstGeom prst="rect">
             <a:avLst/>
@@ -7758,7 +7817,7 @@
           <a:p>
             <a:r>
               <a:rPr lang="pt-BR" sz="1200" dirty="0" smtClean="0"/>
-              <a:t>Weslley</a:t>
+              <a:t>W</a:t>
             </a:r>
             <a:endParaRPr lang="pt-BR" sz="1200" dirty="0"/>
           </a:p>
@@ -7768,6 +7827,116 @@
     <p:extLst>
       <p:ext uri="{BB962C8B-B14F-4D97-AF65-F5344CB8AC3E}">
         <p14:creationId xmlns:p14="http://schemas.microsoft.com/office/powerpoint/2010/main" val="3873075639"/>
+      </p:ext>
+    </p:extLst>
+  </p:cSld>
+  <p:clrMapOvr>
+    <a:masterClrMapping/>
+  </p:clrMapOvr>
+  <p:timing>
+    <p:tnLst>
+      <p:par>
+        <p:cTn id="1" dur="indefinite" restart="never" nodeType="tmRoot"/>
+      </p:par>
+    </p:tnLst>
+  </p:timing>
+</p:sld>
+</file>
+
+<file path=ppt/slides/slide24.xml><?xml version="1.0" encoding="utf-8"?>
+<p:sld xmlns:a="http://schemas.openxmlformats.org/drawingml/2006/main" xmlns:r="http://schemas.openxmlformats.org/officeDocument/2006/relationships" xmlns:p="http://schemas.openxmlformats.org/presentationml/2006/main">
+  <p:cSld>
+    <p:spTree>
+      <p:nvGrpSpPr>
+        <p:cNvPr id="1" name=""/>
+        <p:cNvGrpSpPr/>
+        <p:nvPr/>
+      </p:nvGrpSpPr>
+      <p:grpSpPr>
+        <a:xfrm>
+          <a:off x="0" y="0"/>
+          <a:ext cx="0" cy="0"/>
+          <a:chOff x="0" y="0"/>
+          <a:chExt cx="0" cy="0"/>
+        </a:xfrm>
+      </p:grpSpPr>
+      <p:sp>
+        <p:nvSpPr>
+          <p:cNvPr id="2" name="Título 1"/>
+          <p:cNvSpPr>
+            <a:spLocks noGrp="1"/>
+          </p:cNvSpPr>
+          <p:nvPr>
+            <p:ph type="ctrTitle"/>
+          </p:nvPr>
+        </p:nvSpPr>
+        <p:spPr>
+          <a:xfrm>
+            <a:off x="1659681" y="116632"/>
+            <a:ext cx="6080671" cy="1636354"/>
+          </a:xfrm>
+        </p:spPr>
+        <p:txBody>
+          <a:bodyPr>
+            <a:noAutofit/>
+          </a:bodyPr>
+          <a:lstStyle/>
+          <a:p>
+            <a:pPr algn="ctr"/>
+            <a:r>
+              <a:rPr lang="pt-BR" sz="8000" b="0" dirty="0" smtClean="0">
+                <a:effectLst/>
+              </a:rPr>
+              <a:t>OBRIGADO!</a:t>
+            </a:r>
+            <a:endParaRPr lang="pt-BR" sz="8000" b="0" dirty="0">
+              <a:effectLst/>
+            </a:endParaRPr>
+          </a:p>
+        </p:txBody>
+      </p:sp>
+      <p:sp>
+        <p:nvSpPr>
+          <p:cNvPr id="3" name="Subtítulo 2"/>
+          <p:cNvSpPr>
+            <a:spLocks noGrp="1"/>
+          </p:cNvSpPr>
+          <p:nvPr>
+            <p:ph type="subTitle" idx="1"/>
+          </p:nvPr>
+        </p:nvSpPr>
+        <p:spPr>
+          <a:xfrm>
+            <a:off x="467544" y="2636912"/>
+            <a:ext cx="8280920" cy="2016224"/>
+          </a:xfrm>
+        </p:spPr>
+        <p:txBody>
+          <a:bodyPr>
+            <a:noAutofit/>
+          </a:bodyPr>
+          <a:lstStyle/>
+          <a:p>
+            <a:pPr algn="ctr"/>
+            <a:r>
+              <a:rPr lang="pt-BR" sz="4800" b="1" dirty="0" smtClean="0"/>
+              <a:t>DÚVIDAS? </a:t>
+            </a:r>
+          </a:p>
+          <a:p>
+            <a:pPr algn="ctr"/>
+            <a:r>
+              <a:rPr lang="pt-BR" sz="4800" b="1" dirty="0" smtClean="0"/>
+              <a:t>PERGUNTAS?</a:t>
+            </a:r>
+            <a:endParaRPr lang="pt-BR" sz="4800" b="1" dirty="0"/>
+          </a:p>
+        </p:txBody>
+      </p:sp>
+    </p:spTree>
+    <p:extLst>
+      <p:ext uri="{BB962C8B-B14F-4D97-AF65-F5344CB8AC3E}">
+        <p14:creationId xmlns:p14="http://schemas.microsoft.com/office/powerpoint/2010/main" val="2473511281"/>
       </p:ext>
     </p:extLst>
   </p:cSld>
@@ -7922,8 +8091,8 @@
         </p:nvSpPr>
         <p:spPr>
           <a:xfrm>
-            <a:off x="8316416" y="6390123"/>
-            <a:ext cx="638316" cy="276999"/>
+            <a:off x="8538022" y="6390123"/>
+            <a:ext cx="282450" cy="276999"/>
           </a:xfrm>
           <a:prstGeom prst="rect">
             <a:avLst/>
@@ -7938,7 +8107,7 @@
           <a:p>
             <a:r>
               <a:rPr lang="pt-BR" sz="1200" dirty="0" smtClean="0"/>
-              <a:t>Rafael</a:t>
+              <a:t>R</a:t>
             </a:r>
             <a:endParaRPr lang="pt-BR" sz="1200" dirty="0"/>
           </a:p>
@@ -7993,8 +8162,8 @@
         </p:nvSpPr>
         <p:spPr>
           <a:xfrm>
-            <a:off x="368030" y="1628800"/>
-            <a:ext cx="3771922" cy="4416604"/>
+            <a:off x="368029" y="1196751"/>
+            <a:ext cx="5407755" cy="5193371"/>
           </a:xfrm>
         </p:spPr>
         <p:txBody>
@@ -8002,6 +8171,29 @@
             <a:noAutofit/>
           </a:bodyPr>
           <a:lstStyle/>
+          <a:p>
+            <a:pPr>
+              <a:buFont typeface="Arial" panose="020B0604020202020204" pitchFamily="34" charset="0"/>
+              <a:buChar char="•"/>
+            </a:pPr>
+            <a:r>
+              <a:rPr lang="pt-BR" sz="3200" dirty="0" smtClean="0"/>
+              <a:t>Data-</a:t>
+            </a:r>
+            <a:r>
+              <a:rPr lang="pt-BR" sz="3200" dirty="0" err="1" smtClean="0"/>
+              <a:t>Driven</a:t>
+            </a:r>
+            <a:r>
+              <a:rPr lang="pt-BR" sz="3200" dirty="0" smtClean="0"/>
+              <a:t> </a:t>
+            </a:r>
+            <a:r>
+              <a:rPr lang="pt-BR" sz="3200" dirty="0" err="1" smtClean="0"/>
+              <a:t>Documents</a:t>
+            </a:r>
+            <a:endParaRPr lang="pt-BR" sz="3200" dirty="0" smtClean="0"/>
+          </a:p>
           <a:p>
             <a:pPr>
               <a:buFont typeface="Arial" panose="020B0604020202020204" pitchFamily="34" charset="0"/>
@@ -8128,7 +8320,7 @@
         </p:blipFill>
         <p:spPr>
           <a:xfrm>
-            <a:off x="5757633" y="1320936"/>
+            <a:off x="5973657" y="1347087"/>
             <a:ext cx="903974" cy="903974"/>
           </a:xfrm>
           <a:prstGeom prst="rect">
@@ -8168,7 +8360,7 @@
         </p:blipFill>
         <p:spPr>
           <a:xfrm>
-            <a:off x="4069670" y="2601779"/>
+            <a:off x="4285694" y="2627930"/>
             <a:ext cx="1470621" cy="1102966"/>
           </a:xfrm>
           <a:prstGeom prst="rect">
@@ -8204,7 +8396,7 @@
         </p:blipFill>
         <p:spPr>
           <a:xfrm>
-            <a:off x="5775784" y="2582011"/>
+            <a:off x="5991808" y="2608162"/>
             <a:ext cx="979461" cy="1103301"/>
           </a:xfrm>
           <a:prstGeom prst="rect">
@@ -8244,7 +8436,7 @@
         </p:blipFill>
         <p:spPr>
           <a:xfrm>
-            <a:off x="7182252" y="2601778"/>
+            <a:off x="7398276" y="2627929"/>
             <a:ext cx="1134164" cy="1134164"/>
           </a:xfrm>
           <a:prstGeom prst="rect">
@@ -8284,7 +8476,7 @@
         </p:blipFill>
         <p:spPr>
           <a:xfrm>
-            <a:off x="5631734" y="4149080"/>
+            <a:off x="5847758" y="4175231"/>
             <a:ext cx="1358753" cy="1197985"/>
           </a:xfrm>
           <a:prstGeom prst="rect">
@@ -8310,8 +8502,8 @@
         </p:nvSpPr>
         <p:spPr>
           <a:xfrm>
-            <a:off x="8316416" y="6390123"/>
-            <a:ext cx="596638" cy="276999"/>
+            <a:off x="8480442" y="6390123"/>
+            <a:ext cx="268022" cy="276999"/>
           </a:xfrm>
           <a:prstGeom prst="rect">
             <a:avLst/>
@@ -8326,7 +8518,7 @@
           <a:p>
             <a:r>
               <a:rPr lang="pt-BR" sz="1200" dirty="0" smtClean="0"/>
-              <a:t>Sarah</a:t>
+              <a:t>S</a:t>
             </a:r>
             <a:endParaRPr lang="pt-BR" sz="1200" dirty="0"/>
           </a:p>
@@ -8382,7 +8574,7 @@
         <p:spPr>
           <a:xfrm>
             <a:off x="467544" y="1700808"/>
-            <a:ext cx="7520940" cy="2736304"/>
+            <a:ext cx="7520940" cy="3600400"/>
           </a:xfrm>
         </p:spPr>
         <p:txBody>
@@ -8426,9 +8618,14 @@
               <a:buChar char="•"/>
             </a:pPr>
             <a:r>
+              <a:rPr lang="pt-BR" sz="3200" dirty="0"/>
+              <a:t>Orientado a </a:t>
+            </a:r>
+            <a:r>
               <a:rPr lang="pt-BR" sz="3200" dirty="0" smtClean="0"/>
-              <a:t>Lado cliente</a:t>
-            </a:r>
+              <a:t>Objetos</a:t>
+            </a:r>
+            <a:endParaRPr lang="pt-BR" sz="3200" dirty="0" smtClean="0"/>
           </a:p>
           <a:p>
             <a:pPr>
@@ -8437,9 +8634,13 @@
             </a:pPr>
             <a:r>
               <a:rPr lang="pt-BR" sz="3200" dirty="0" smtClean="0"/>
-              <a:t>Orientado a Objetos</a:t>
-            </a:r>
-            <a:endParaRPr lang="pt-BR" sz="3200" dirty="0"/>
+              <a:t>Lado </a:t>
+            </a:r>
+            <a:r>
+              <a:rPr lang="pt-BR" sz="3200" dirty="0" smtClean="0"/>
+              <a:t>cliente</a:t>
+            </a:r>
+            <a:endParaRPr lang="pt-BR" sz="3200" dirty="0" smtClean="0"/>
           </a:p>
         </p:txBody>
       </p:sp>
@@ -8479,8 +8680,8 @@
         </p:nvSpPr>
         <p:spPr>
           <a:xfrm>
-            <a:off x="8316416" y="6390123"/>
-            <a:ext cx="734496" cy="276999"/>
+            <a:off x="8504360" y="6390123"/>
+            <a:ext cx="316112" cy="276999"/>
           </a:xfrm>
           <a:prstGeom prst="rect">
             <a:avLst/>
@@ -8495,7 +8696,7 @@
           <a:p>
             <a:r>
               <a:rPr lang="pt-BR" sz="1200" dirty="0" smtClean="0"/>
-              <a:t>Weslley</a:t>
+              <a:t>W</a:t>
             </a:r>
             <a:endParaRPr lang="pt-BR" sz="1200" dirty="0"/>
           </a:p>
@@ -8697,8 +8898,8 @@
         </p:nvSpPr>
         <p:spPr>
           <a:xfrm>
-            <a:off x="8316416" y="6390123"/>
-            <a:ext cx="638316" cy="276999"/>
+            <a:off x="8466014" y="6390123"/>
+            <a:ext cx="282450" cy="276999"/>
           </a:xfrm>
           <a:prstGeom prst="rect">
             <a:avLst/>
@@ -8713,7 +8914,7 @@
           <a:p>
             <a:r>
               <a:rPr lang="pt-BR" sz="1200" dirty="0" smtClean="0"/>
-              <a:t>Rafael</a:t>
+              <a:t>R</a:t>
             </a:r>
             <a:endParaRPr lang="pt-BR" sz="1200" dirty="0"/>
           </a:p>
@@ -8783,8 +8984,28 @@
               <a:buChar char="•"/>
             </a:pPr>
             <a:r>
+              <a:rPr lang="pt-BR" sz="3200" dirty="0" err="1" smtClean="0"/>
+              <a:t>Document</a:t>
+            </a:r>
+            <a:r>
               <a:rPr lang="pt-BR" sz="3200" dirty="0" smtClean="0"/>
-              <a:t>Linguagem neutra</a:t>
+              <a:t> </a:t>
+            </a:r>
+            <a:r>
+              <a:rPr lang="pt-BR" sz="3200" dirty="0" err="1" smtClean="0"/>
+              <a:t>Object</a:t>
+            </a:r>
+            <a:r>
+              <a:rPr lang="pt-BR" sz="3200" dirty="0" smtClean="0"/>
+              <a:t> </a:t>
+            </a:r>
+            <a:r>
+              <a:rPr lang="pt-BR" sz="3200" dirty="0" err="1" smtClean="0"/>
+              <a:t>Model</a:t>
+            </a:r>
+            <a:r>
+              <a:rPr lang="pt-BR" sz="3200" dirty="0" smtClean="0"/>
+              <a:t> </a:t>
             </a:r>
           </a:p>
           <a:p>
@@ -8793,8 +9014,8 @@
               <a:buChar char="•"/>
             </a:pPr>
             <a:r>
-              <a:rPr lang="pt-BR" sz="3200" dirty="0" smtClean="0"/>
-              <a:t>Acessar e atualizar</a:t>
+              <a:rPr lang="pt-BR" sz="3200" dirty="0"/>
+              <a:t>Modelo de documento a objeto</a:t>
             </a:r>
           </a:p>
           <a:p>
@@ -8804,7 +9025,7 @@
             </a:pPr>
             <a:r>
               <a:rPr lang="pt-BR" sz="3200" dirty="0" smtClean="0"/>
-              <a:t>Dinamismo ao conteúdo</a:t>
+              <a:t>Linguagem neutra</a:t>
             </a:r>
           </a:p>
           <a:p>
@@ -8814,7 +9035,7 @@
             </a:pPr>
             <a:r>
               <a:rPr lang="pt-BR" sz="3200" dirty="0" smtClean="0"/>
-              <a:t>Estrutura</a:t>
+              <a:t>Acessar e atualizar</a:t>
             </a:r>
           </a:p>
           <a:p>
@@ -8824,6 +9045,26 @@
             </a:pPr>
             <a:r>
               <a:rPr lang="pt-BR" sz="3200" dirty="0" smtClean="0"/>
+              <a:t>Dinamicamente o conteúdo</a:t>
+            </a:r>
+          </a:p>
+          <a:p>
+            <a:pPr>
+              <a:buFont typeface="Arial" panose="020B0604020202020204" pitchFamily="34" charset="0"/>
+              <a:buChar char="•"/>
+            </a:pPr>
+            <a:r>
+              <a:rPr lang="pt-BR" sz="3200" dirty="0" smtClean="0"/>
+              <a:t>Estrutura</a:t>
+            </a:r>
+          </a:p>
+          <a:p>
+            <a:pPr>
+              <a:buFont typeface="Arial" panose="020B0604020202020204" pitchFamily="34" charset="0"/>
+              <a:buChar char="•"/>
+            </a:pPr>
+            <a:r>
+              <a:rPr lang="pt-BR" sz="3200" dirty="0" smtClean="0"/>
               <a:t>Estilos</a:t>
             </a:r>
             <a:endParaRPr lang="pt-BR" sz="3200" dirty="0"/>
@@ -8861,8 +9102,8 @@
         </p:nvSpPr>
         <p:spPr>
           <a:xfrm>
-            <a:off x="8316416" y="6390123"/>
-            <a:ext cx="596638" cy="276999"/>
+            <a:off x="8552450" y="6390123"/>
+            <a:ext cx="268022" cy="276999"/>
           </a:xfrm>
           <a:prstGeom prst="rect">
             <a:avLst/>
@@ -8877,7 +9118,7 @@
           <a:p>
             <a:r>
               <a:rPr lang="pt-BR" sz="1200" dirty="0" smtClean="0"/>
-              <a:t>Sarah</a:t>
+              <a:t>S</a:t>
             </a:r>
             <a:endParaRPr lang="pt-BR" sz="1200" dirty="0"/>
           </a:p>
@@ -8947,9 +9188,26 @@
               <a:buChar char="•"/>
             </a:pPr>
             <a:r>
-              <a:rPr lang="pt-BR" sz="3200" dirty="0" smtClean="0"/>
-              <a:t>Folha de estilo</a:t>
-            </a:r>
+              <a:rPr lang="pt-BR" sz="3200" dirty="0" err="1"/>
+              <a:t>Cascading</a:t>
+            </a:r>
+            <a:r>
+              <a:rPr lang="pt-BR" sz="3200" dirty="0"/>
+              <a:t> </a:t>
+            </a:r>
+            <a:r>
+              <a:rPr lang="pt-BR" sz="3200" dirty="0" err="1"/>
+              <a:t>Style</a:t>
+            </a:r>
+            <a:r>
+              <a:rPr lang="pt-BR" sz="3200" dirty="0"/>
+              <a:t> </a:t>
+            </a:r>
+            <a:r>
+              <a:rPr lang="pt-BR" sz="3200" dirty="0" err="1" smtClean="0"/>
+              <a:t>Sheets</a:t>
+            </a:r>
+            <a:endParaRPr lang="pt-BR" sz="3200" dirty="0" smtClean="0"/>
           </a:p>
           <a:p>
             <a:pPr>
@@ -8957,26 +9215,9 @@
               <a:buChar char="•"/>
             </a:pPr>
             <a:r>
-              <a:rPr lang="pt-BR" sz="3200" dirty="0" err="1" smtClean="0"/>
-              <a:t>Cascading</a:t>
-            </a:r>
-            <a:r>
               <a:rPr lang="pt-BR" sz="3200" dirty="0" smtClean="0"/>
-              <a:t> </a:t>
-            </a:r>
-            <a:r>
-              <a:rPr lang="pt-BR" sz="3200" dirty="0" err="1"/>
-              <a:t>Style</a:t>
-            </a:r>
-            <a:r>
-              <a:rPr lang="pt-BR" sz="3200" dirty="0"/>
-              <a:t> </a:t>
-            </a:r>
-            <a:r>
-              <a:rPr lang="pt-BR" sz="3200" dirty="0" err="1" smtClean="0"/>
-              <a:t>Sheets</a:t>
-            </a:r>
-            <a:endParaRPr lang="pt-BR" sz="3200" dirty="0" smtClean="0"/>
+              <a:t>Folha de estilo em cascata</a:t>
+            </a:r>
           </a:p>
           <a:p>
             <a:pPr>
@@ -8997,6 +9238,16 @@
               <a:rPr lang="pt-BR" sz="3200" dirty="0" smtClean="0"/>
               <a:t>Manutenção</a:t>
             </a:r>
+          </a:p>
+          <a:p>
+            <a:pPr>
+              <a:buFont typeface="Arial" panose="020B0604020202020204" pitchFamily="34" charset="0"/>
+              <a:buChar char="•"/>
+            </a:pPr>
+            <a:r>
+              <a:rPr lang="pt-BR" sz="3200" dirty="0" smtClean="0"/>
+              <a:t>Cor, tamanho e disposição dos elementos</a:t>
+            </a:r>
             <a:endParaRPr lang="pt-BR" sz="3200" dirty="0"/>
           </a:p>
         </p:txBody>
@@ -9032,8 +9283,8 @@
         </p:nvSpPr>
         <p:spPr>
           <a:xfrm>
-            <a:off x="8244408" y="6390123"/>
-            <a:ext cx="734496" cy="276999"/>
+            <a:off x="8432352" y="6390123"/>
+            <a:ext cx="316112" cy="276999"/>
           </a:xfrm>
           <a:prstGeom prst="rect">
             <a:avLst/>
@@ -9048,7 +9299,7 @@
           <a:p>
             <a:r>
               <a:rPr lang="pt-BR" sz="1200" dirty="0" smtClean="0"/>
-              <a:t>Weslley</a:t>
+              <a:t>W</a:t>
             </a:r>
             <a:endParaRPr lang="pt-BR" sz="1200" dirty="0"/>
           </a:p>
@@ -9210,8 +9461,8 @@
         </p:nvSpPr>
         <p:spPr>
           <a:xfrm>
-            <a:off x="8316416" y="6536377"/>
-            <a:ext cx="615874" cy="276999"/>
+            <a:off x="8482044" y="6536377"/>
+            <a:ext cx="266420" cy="276999"/>
           </a:xfrm>
           <a:prstGeom prst="rect">
             <a:avLst/>
@@ -9226,7 +9477,7 @@
           <a:p>
             <a:r>
               <a:rPr lang="pt-BR" sz="1200" dirty="0" smtClean="0"/>
-              <a:t>Flávio</a:t>
+              <a:t>F</a:t>
             </a:r>
             <a:endParaRPr lang="pt-BR" sz="1200" dirty="0"/>
           </a:p>

</xml_diff>